<commit_message>
Last editing and checking
</commit_message>
<xml_diff>
--- a/doc/presentation/MyPresentation.pptx
+++ b/doc/presentation/MyPresentation.pptx
@@ -1132,11 +1132,7 @@
         <a:p>
           <a:r>
             <a:rPr lang="en-US" dirty="0" smtClean="0"/>
-            <a:t>Topic Modeling </a:t>
-          </a:r>
-          <a:r>
-            <a:rPr lang="en-US" dirty="0" smtClean="0"/>
-            <a:t> using Latent </a:t>
+            <a:t>Topic Modeling  using Latent </a:t>
           </a:r>
           <a:r>
             <a:rPr lang="en-US" dirty="0" err="1" smtClean="0"/>
@@ -1653,6 +1649,80 @@
         </a:p>
       </dgm:t>
     </dgm:pt>
+    <dgm:pt modelId="{7E7A2878-4AAF-443C-B9EC-AD7106874C6C}">
+      <dgm:prSet phldrT="[Text]"/>
+      <dgm:spPr/>
+      <dgm:t>
+        <a:bodyPr/>
+        <a:lstStyle/>
+        <a:p>
+          <a:r>
+            <a:rPr lang="en-US" dirty="0" smtClean="0"/>
+            <a:t>Cross reference the topic and review stars also topic, review star, and business star</a:t>
+          </a:r>
+          <a:endParaRPr lang="en-US" dirty="0"/>
+        </a:p>
+      </dgm:t>
+    </dgm:pt>
+    <dgm:pt modelId="{19A1D5D8-C776-4ECB-9950-C13CED714D61}" type="parTrans" cxnId="{D365BAAA-F5FC-4D50-8A7C-CC85B8876676}">
+      <dgm:prSet/>
+      <dgm:spPr/>
+      <dgm:t>
+        <a:bodyPr/>
+        <a:lstStyle/>
+        <a:p>
+          <a:endParaRPr lang="en-US"/>
+        </a:p>
+      </dgm:t>
+    </dgm:pt>
+    <dgm:pt modelId="{74F5FE8D-D695-4701-BD51-CDDEE8976EEA}" type="sibTrans" cxnId="{D365BAAA-F5FC-4D50-8A7C-CC85B8876676}">
+      <dgm:prSet/>
+      <dgm:spPr/>
+      <dgm:t>
+        <a:bodyPr/>
+        <a:lstStyle/>
+        <a:p>
+          <a:endParaRPr lang="en-US"/>
+        </a:p>
+      </dgm:t>
+    </dgm:pt>
+    <dgm:pt modelId="{F9E3CA80-AEC9-4781-998C-6A32D359A69D}">
+      <dgm:prSet phldrT="[Text]"/>
+      <dgm:spPr/>
+      <dgm:t>
+        <a:bodyPr/>
+        <a:lstStyle/>
+        <a:p>
+          <a:r>
+            <a:rPr lang="en-US" dirty="0" smtClean="0"/>
+            <a:t>Uncover the terms that are indicative of positive, negative reviews</a:t>
+          </a:r>
+          <a:endParaRPr lang="en-US" dirty="0"/>
+        </a:p>
+      </dgm:t>
+    </dgm:pt>
+    <dgm:pt modelId="{E07725B3-4D2F-44BA-B463-C27FA4180305}" type="parTrans" cxnId="{3C723B84-9D9C-4A2E-B4E8-8A7349C71920}">
+      <dgm:prSet/>
+      <dgm:spPr/>
+      <dgm:t>
+        <a:bodyPr/>
+        <a:lstStyle/>
+        <a:p>
+          <a:endParaRPr lang="en-US"/>
+        </a:p>
+      </dgm:t>
+    </dgm:pt>
+    <dgm:pt modelId="{EA0A2730-C2F6-4E95-8893-85AB08CF5823}" type="sibTrans" cxnId="{3C723B84-9D9C-4A2E-B4E8-8A7349C71920}">
+      <dgm:prSet/>
+      <dgm:spPr/>
+      <dgm:t>
+        <a:bodyPr/>
+        <a:lstStyle/>
+        <a:p>
+          <a:endParaRPr lang="en-US"/>
+        </a:p>
+      </dgm:t>
+    </dgm:pt>
     <dgm:pt modelId="{DA5481D8-49F6-4363-B6D3-B19616BC798F}" type="pres">
       <dgm:prSet presAssocID="{0F1124F1-BB4A-407B-891B-BB9B9DC77E71}" presName="linear" presStyleCnt="0">
         <dgm:presLayoutVars>
@@ -1887,30 +1957,33 @@
     <dgm:cxn modelId="{E9AD0B7A-EC35-4D97-941A-C7E0E1754197}" srcId="{9275A3F9-724D-4C3B-AD32-4C0CA29A212A}" destId="{860AF616-77DB-4B6C-BEF9-0C2E50B8182B}" srcOrd="4" destOrd="0" parTransId="{36188AB8-ECDA-4857-8782-68B58D858438}" sibTransId="{16B69289-1CB0-488B-BF24-D5F208BA5AC5}"/>
     <dgm:cxn modelId="{6E4999AE-38EA-4A10-B7B1-39A0A4E1DE24}" srcId="{C6E33E3B-4A34-4867-B930-55E192878CB0}" destId="{D8BEA258-909F-492F-892C-57351263A4C1}" srcOrd="2" destOrd="0" parTransId="{0185E038-8289-42FF-B55C-E68598F55234}" sibTransId="{108992B0-A31E-4F71-9787-129C269C9B90}"/>
     <dgm:cxn modelId="{1A1B8170-D663-4A95-A5EC-C51E27598036}" type="presOf" srcId="{860AF616-77DB-4B6C-BEF9-0C2E50B8182B}" destId="{904B8CB1-8C8B-40AF-B953-D228748C4D2E}" srcOrd="0" destOrd="4" presId="urn:microsoft.com/office/officeart/2005/8/layout/list1"/>
+    <dgm:cxn modelId="{FE2C142F-5CE1-43E5-B85D-BECCC7D47E08}" srcId="{9275A3F9-724D-4C3B-AD32-4C0CA29A212A}" destId="{E4E65F8C-A356-4622-91E6-733B2D302BF8}" srcOrd="1" destOrd="0" parTransId="{E28AE0D5-5B90-4ED2-8472-B80EADABD49B}" sibTransId="{550DE831-782C-4453-BE54-D8A2986F998A}"/>
+    <dgm:cxn modelId="{44A04D54-47F6-4A40-8F4B-6E6FD8713FD9}" type="presOf" srcId="{E4E65F8C-A356-4622-91E6-733B2D302BF8}" destId="{904B8CB1-8C8B-40AF-B953-D228748C4D2E}" srcOrd="0" destOrd="1" presId="urn:microsoft.com/office/officeart/2005/8/layout/list1"/>
     <dgm:cxn modelId="{BCF9B5F2-EAA1-4DD0-8183-E303CC094F82}" type="presOf" srcId="{DB90EB38-D9C4-400E-9051-0265E8A28934}" destId="{A414A348-CDA7-41FF-A3DC-FDE2157D9BCB}" srcOrd="1" destOrd="0" presId="urn:microsoft.com/office/officeart/2005/8/layout/list1"/>
-    <dgm:cxn modelId="{44A04D54-47F6-4A40-8F4B-6E6FD8713FD9}" type="presOf" srcId="{E4E65F8C-A356-4622-91E6-733B2D302BF8}" destId="{904B8CB1-8C8B-40AF-B953-D228748C4D2E}" srcOrd="0" destOrd="1" presId="urn:microsoft.com/office/officeart/2005/8/layout/list1"/>
-    <dgm:cxn modelId="{FE2C142F-5CE1-43E5-B85D-BECCC7D47E08}" srcId="{9275A3F9-724D-4C3B-AD32-4C0CA29A212A}" destId="{E4E65F8C-A356-4622-91E6-733B2D302BF8}" srcOrd="1" destOrd="0" parTransId="{E28AE0D5-5B90-4ED2-8472-B80EADABD49B}" sibTransId="{550DE831-782C-4453-BE54-D8A2986F998A}"/>
     <dgm:cxn modelId="{F4C55C3A-7E68-47D7-916C-8266D7A9743B}" type="presOf" srcId="{D8BEA258-909F-492F-892C-57351263A4C1}" destId="{B135836A-5259-4053-8883-2CEDCB53BFBC}" srcOrd="0" destOrd="2" presId="urn:microsoft.com/office/officeart/2005/8/layout/list1"/>
     <dgm:cxn modelId="{A1B476BA-F268-4EB3-9AC3-F9734982C0A2}" srcId="{DB90EB38-D9C4-400E-9051-0265E8A28934}" destId="{4219EA2B-9139-43D1-94E9-4BB7D30D962A}" srcOrd="0" destOrd="0" parTransId="{8289E78E-4F78-49BC-A390-599DE843D3EC}" sibTransId="{A6D59B80-2003-4DFF-91CD-7264D614946B}"/>
     <dgm:cxn modelId="{C5C6B0A6-F828-490F-A2A4-348E66057FC0}" type="presOf" srcId="{DB90EB38-D9C4-400E-9051-0265E8A28934}" destId="{93BC6D9D-1401-413B-BEBB-5F4FF77CEADF}" srcOrd="0" destOrd="0" presId="urn:microsoft.com/office/officeart/2005/8/layout/list1"/>
     <dgm:cxn modelId="{B08A7300-5420-4B3F-AB7B-B9EA4A1B2CDA}" type="presOf" srcId="{56C6956C-A08C-4B26-BB21-BFE264F004A8}" destId="{F0AF03FD-7C24-4393-9342-DAE729543B66}" srcOrd="0" destOrd="0" presId="urn:microsoft.com/office/officeart/2005/8/layout/list1"/>
     <dgm:cxn modelId="{8AF80A01-83C4-4ACD-884B-262D9B9A1392}" srcId="{0F1124F1-BB4A-407B-891B-BB9B9DC77E71}" destId="{03292351-BA20-4242-A909-FC6FD069DF99}" srcOrd="3" destOrd="0" parTransId="{FBDCBBF3-159D-4167-BA1A-547549DE8325}" sibTransId="{F944F270-7716-457D-BE28-A2F1C4CF0772}"/>
     <dgm:cxn modelId="{3E32D02B-9E77-435F-9CBF-AC0D7524FA68}" type="presOf" srcId="{320800BE-DE8B-4174-82AF-3AA344187A85}" destId="{B135836A-5259-4053-8883-2CEDCB53BFBC}" srcOrd="0" destOrd="0" presId="urn:microsoft.com/office/officeart/2005/8/layout/list1"/>
+    <dgm:cxn modelId="{0430A16F-43C8-4640-BA2B-CD87D33841AB}" type="presOf" srcId="{F9E3CA80-AEC9-4781-998C-6A32D359A69D}" destId="{2D50D6F6-D45C-434F-B4FD-F7EEEBB3D0E6}" srcOrd="0" destOrd="2" presId="urn:microsoft.com/office/officeart/2005/8/layout/list1"/>
     <dgm:cxn modelId="{54FAF91D-7301-4C2A-9198-51936A3F2866}" srcId="{9275A3F9-724D-4C3B-AD32-4C0CA29A212A}" destId="{4E958641-EF01-45A6-8504-29227A8D173C}" srcOrd="3" destOrd="0" parTransId="{7FAB8E2A-84C1-4D97-BD44-003233F2C4D0}" sibTransId="{40604F42-14D6-48EC-8B00-D88F5DF74404}"/>
     <dgm:cxn modelId="{D3A9C1D6-9F6F-4B5E-B624-C0F196A429EB}" srcId="{0F1124F1-BB4A-407B-891B-BB9B9DC77E71}" destId="{C6E33E3B-4A34-4867-B930-55E192878CB0}" srcOrd="0" destOrd="0" parTransId="{E54F3B08-85D9-49EE-B4E9-4A3FE534E280}" sibTransId="{7561114D-7A88-4C62-BC4D-BC099F31C22D}"/>
     <dgm:cxn modelId="{F0503ACB-14AE-4660-8053-4B59D24839D9}" type="presOf" srcId="{136F2A81-73A2-46C4-AE82-023DF0471795}" destId="{904B8CB1-8C8B-40AF-B953-D228748C4D2E}" srcOrd="0" destOrd="0" presId="urn:microsoft.com/office/officeart/2005/8/layout/list1"/>
+    <dgm:cxn modelId="{3C723B84-9D9C-4A2E-B4E8-8A7349C71920}" srcId="{DB90EB38-D9C4-400E-9051-0265E8A28934}" destId="{F9E3CA80-AEC9-4781-998C-6A32D359A69D}" srcOrd="2" destOrd="0" parTransId="{E07725B3-4D2F-44BA-B463-C27FA4180305}" sibTransId="{EA0A2730-C2F6-4E95-8893-85AB08CF5823}"/>
     <dgm:cxn modelId="{C9C8BE34-4B84-4B4E-9CF5-FA8A2722A4F1}" type="presOf" srcId="{8A6C606E-9CA3-4B88-8AC5-9D63F22CFB58}" destId="{B135836A-5259-4053-8883-2CEDCB53BFBC}" srcOrd="0" destOrd="3" presId="urn:microsoft.com/office/officeart/2005/8/layout/list1"/>
     <dgm:cxn modelId="{B6159B95-1F6E-45CC-A07E-92360AB2611B}" type="presOf" srcId="{03292351-BA20-4242-A909-FC6FD069DF99}" destId="{D7C977B8-F5F4-4C4A-BE72-1535C1E4952F}" srcOrd="0" destOrd="0" presId="urn:microsoft.com/office/officeart/2005/8/layout/list1"/>
     <dgm:cxn modelId="{D3845128-78F6-4150-9CB2-FD8AC48C4270}" type="presOf" srcId="{16775495-15DF-4DE0-BA86-B53AB833B24E}" destId="{B135836A-5259-4053-8883-2CEDCB53BFBC}" srcOrd="0" destOrd="4" presId="urn:microsoft.com/office/officeart/2005/8/layout/list1"/>
     <dgm:cxn modelId="{6A099B7B-89E9-4FA9-8C44-90867E221DE1}" srcId="{03292351-BA20-4242-A909-FC6FD069DF99}" destId="{56C6956C-A08C-4B26-BB21-BFE264F004A8}" srcOrd="0" destOrd="0" parTransId="{4FA4C01D-B94D-4B78-BCB4-F437AC543D59}" sibTransId="{69F96DA1-659F-4668-A7FC-DDE0CCEF8F0B}"/>
     <dgm:cxn modelId="{9122A960-C448-4F9E-AD25-05E01DFE1D06}" type="presOf" srcId="{4E958641-EF01-45A6-8504-29227A8D173C}" destId="{904B8CB1-8C8B-40AF-B953-D228748C4D2E}" srcOrd="0" destOrd="3" presId="urn:microsoft.com/office/officeart/2005/8/layout/list1"/>
-    <dgm:cxn modelId="{FFD7F8D7-32AC-4D67-BE24-67A52426AF5C}" type="presOf" srcId="{0F1124F1-BB4A-407B-891B-BB9B9DC77E71}" destId="{DA5481D8-49F6-4363-B6D3-B19616BC798F}" srcOrd="0" destOrd="0" presId="urn:microsoft.com/office/officeart/2005/8/layout/list1"/>
     <dgm:cxn modelId="{FC6DEBC9-E171-431B-9741-D4105C71BCB2}" srcId="{C6E33E3B-4A34-4867-B930-55E192878CB0}" destId="{16775495-15DF-4DE0-BA86-B53AB833B24E}" srcOrd="4" destOrd="0" parTransId="{FFDDA656-9A32-4AD5-93DE-C26F25AE7134}" sibTransId="{210B81D2-1B02-466B-8CCA-F9F93C574CFD}"/>
     <dgm:cxn modelId="{FB6B6EF4-3062-478F-8592-71C17A394725}" type="presOf" srcId="{C6E33E3B-4A34-4867-B930-55E192878CB0}" destId="{9D328815-686E-4587-8A37-16ECD0204B6B}" srcOrd="1" destOrd="0" presId="urn:microsoft.com/office/officeart/2005/8/layout/list1"/>
     <dgm:cxn modelId="{517EB715-AC48-4DEF-9694-F8FE387A4992}" srcId="{C6E33E3B-4A34-4867-B930-55E192878CB0}" destId="{102ED6D0-D3D7-4A70-ABC1-87AA013FE6F8}" srcOrd="1" destOrd="0" parTransId="{E4547D3E-10D7-4FBB-9041-15E73D9797FA}" sibTransId="{6D445C06-4CA6-4B90-B0DF-9DE706401D4B}"/>
+    <dgm:cxn modelId="{FFD7F8D7-32AC-4D67-BE24-67A52426AF5C}" type="presOf" srcId="{0F1124F1-BB4A-407B-891B-BB9B9DC77E71}" destId="{DA5481D8-49F6-4363-B6D3-B19616BC798F}" srcOrd="0" destOrd="0" presId="urn:microsoft.com/office/officeart/2005/8/layout/list1"/>
     <dgm:cxn modelId="{0EE1A537-824F-44FD-9B2C-9921BFE3C790}" type="presOf" srcId="{03292351-BA20-4242-A909-FC6FD069DF99}" destId="{FE0A26DD-C5A2-43C1-9715-13BAD5CF0CBE}" srcOrd="1" destOrd="0" presId="urn:microsoft.com/office/officeart/2005/8/layout/list1"/>
+    <dgm:cxn modelId="{D365BAAA-F5FC-4D50-8A7C-CC85B8876676}" srcId="{DB90EB38-D9C4-400E-9051-0265E8A28934}" destId="{7E7A2878-4AAF-443C-B9EC-AD7106874C6C}" srcOrd="1" destOrd="0" parTransId="{19A1D5D8-C776-4ECB-9950-C13CED714D61}" sibTransId="{74F5FE8D-D695-4701-BD51-CDDEE8976EEA}"/>
+    <dgm:cxn modelId="{9A79C5F6-D476-49CF-AC68-F4CA14CE399E}" type="presOf" srcId="{8D240DDA-76AC-4909-AD28-24F963EE01A7}" destId="{904B8CB1-8C8B-40AF-B953-D228748C4D2E}" srcOrd="0" destOrd="2" presId="urn:microsoft.com/office/officeart/2005/8/layout/list1"/>
     <dgm:cxn modelId="{9D05D1BC-7EEA-42EB-8B37-661681E7CCE8}" srcId="{C6E33E3B-4A34-4867-B930-55E192878CB0}" destId="{320800BE-DE8B-4174-82AF-3AA344187A85}" srcOrd="0" destOrd="0" parTransId="{027C7FEF-D9D0-4B95-A150-12830DDA86E7}" sibTransId="{CD80068F-E394-4D48-8C27-96365A013D3F}"/>
-    <dgm:cxn modelId="{9A79C5F6-D476-49CF-AC68-F4CA14CE399E}" type="presOf" srcId="{8D240DDA-76AC-4909-AD28-24F963EE01A7}" destId="{904B8CB1-8C8B-40AF-B953-D228748C4D2E}" srcOrd="0" destOrd="2" presId="urn:microsoft.com/office/officeart/2005/8/layout/list1"/>
     <dgm:cxn modelId="{B0DC602B-883B-4C10-AAB3-11A50C0B3BF0}" type="presOf" srcId="{9275A3F9-724D-4C3B-AD32-4C0CA29A212A}" destId="{88425A1B-CE82-4A74-86D7-DFF3A0D39D54}" srcOrd="1" destOrd="0" presId="urn:microsoft.com/office/officeart/2005/8/layout/list1"/>
     <dgm:cxn modelId="{C6268A3F-5018-4073-A6A8-B2D975DEAB74}" type="presOf" srcId="{9275A3F9-724D-4C3B-AD32-4C0CA29A212A}" destId="{F0653103-C18F-4A7C-B56E-39FBA5C9171B}" srcOrd="0" destOrd="0" presId="urn:microsoft.com/office/officeart/2005/8/layout/list1"/>
     <dgm:cxn modelId="{EFAFFBE1-D733-4E6E-8FDB-D3B33D0C93BA}" srcId="{0F1124F1-BB4A-407B-891B-BB9B9DC77E71}" destId="{DB90EB38-D9C4-400E-9051-0265E8A28934}" srcOrd="2" destOrd="0" parTransId="{1587E684-8DAE-4A75-8C18-2E6D4B5675B8}" sibTransId="{B9A7D93F-C1EA-428F-ADD6-12C52404ABEC}"/>
@@ -1920,6 +1993,7 @@
     <dgm:cxn modelId="{126AE502-60B8-44FB-A0DE-4A4F54AA261B}" srcId="{C6E33E3B-4A34-4867-B930-55E192878CB0}" destId="{8A6C606E-9CA3-4B88-8AC5-9D63F22CFB58}" srcOrd="3" destOrd="0" parTransId="{AE70F826-BC19-4D6C-B9C2-5BE865AA76CC}" sibTransId="{91CEBE97-8A27-4D2C-88E4-00752E7D4898}"/>
     <dgm:cxn modelId="{AD625BA6-B502-4D1A-BEBC-D7A103349F95}" srcId="{9275A3F9-724D-4C3B-AD32-4C0CA29A212A}" destId="{8D240DDA-76AC-4909-AD28-24F963EE01A7}" srcOrd="2" destOrd="0" parTransId="{117C77AF-F5F4-44E5-AC93-1E267DA3FDC9}" sibTransId="{04D7AE0F-B739-4344-9C14-F7B68299988F}"/>
     <dgm:cxn modelId="{1A6D1FA4-B99E-4C25-9C79-74DA4422F194}" type="presOf" srcId="{4219EA2B-9139-43D1-94E9-4BB7D30D962A}" destId="{2D50D6F6-D45C-434F-B4FD-F7EEEBB3D0E6}" srcOrd="0" destOrd="0" presId="urn:microsoft.com/office/officeart/2005/8/layout/list1"/>
+    <dgm:cxn modelId="{6AF61BBA-9B2E-49FC-A357-8B4F7CC3E43C}" type="presOf" srcId="{7E7A2878-4AAF-443C-B9EC-AD7106874C6C}" destId="{2D50D6F6-D45C-434F-B4FD-F7EEEBB3D0E6}" srcOrd="0" destOrd="1" presId="urn:microsoft.com/office/officeart/2005/8/layout/list1"/>
     <dgm:cxn modelId="{EE93FA8A-DCA3-42A9-A3B4-37CBD5231133}" type="presOf" srcId="{102ED6D0-D3D7-4A70-ABC1-87AA013FE6F8}" destId="{B135836A-5259-4053-8883-2CEDCB53BFBC}" srcOrd="0" destOrd="1" presId="urn:microsoft.com/office/officeart/2005/8/layout/list1"/>
     <dgm:cxn modelId="{C556E302-12B3-42E7-B0CE-71EA09413DDB}" type="presParOf" srcId="{DA5481D8-49F6-4363-B6D3-B19616BC798F}" destId="{842C0200-8685-47CC-9B7F-3A4DCB136FBD}" srcOrd="0" destOrd="0" presId="urn:microsoft.com/office/officeart/2005/8/layout/list1"/>
     <dgm:cxn modelId="{380F3E4B-15ED-4E4D-AFC9-E7F22C056097}" type="presParOf" srcId="{842C0200-8685-47CC-9B7F-3A4DCB136FBD}" destId="{22D2004A-930F-459D-888D-A563C6307FA0}" srcOrd="0" destOrd="0" presId="urn:microsoft.com/office/officeart/2005/8/layout/list1"/>
@@ -1970,8 +2044,8 @@
       </dsp:nvSpPr>
       <dsp:spPr>
         <a:xfrm>
-          <a:off x="0" y="235961"/>
-          <a:ext cx="8128000" cy="1606500"/>
+          <a:off x="0" y="484069"/>
+          <a:ext cx="8128000" cy="1392300"/>
         </a:xfrm>
         <a:prstGeom prst="rect">
           <a:avLst/>
@@ -2015,12 +2089,12 @@
         <a:fontRef idx="minor"/>
       </dsp:style>
       <dsp:txBody>
-        <a:bodyPr spcFirstLastPara="0" vert="horz" wrap="square" lIns="630823" tIns="312420" rIns="630823" bIns="106680" numCol="1" spcCol="1270" anchor="t" anchorCtr="0">
+        <a:bodyPr spcFirstLastPara="0" vert="horz" wrap="square" lIns="630823" tIns="270764" rIns="630823" bIns="92456" numCol="1" spcCol="1270" anchor="t" anchorCtr="0">
           <a:noAutofit/>
         </a:bodyPr>
         <a:lstStyle/>
         <a:p>
-          <a:pPr marL="114300" lvl="1" indent="-114300" algn="l" defTabSz="666750">
+          <a:pPr marL="114300" lvl="1" indent="-114300" algn="l" defTabSz="577850">
             <a:lnSpc>
               <a:spcPct val="90000"/>
             </a:lnSpc>
@@ -2033,13 +2107,13 @@
             <a:buChar char="••"/>
           </a:pPr>
           <a:r>
-            <a:rPr lang="en-US" sz="1500" kern="1200" dirty="0" smtClean="0"/>
+            <a:rPr lang="en-US" sz="1300" kern="1200" dirty="0" smtClean="0"/>
             <a:t>Reading JSON files into R objects. </a:t>
           </a:r>
-          <a:endParaRPr lang="en-US" sz="1500" kern="1200" dirty="0"/>
+          <a:endParaRPr lang="en-US" sz="1300" kern="1200" dirty="0"/>
         </a:p>
         <a:p>
-          <a:pPr marL="114300" lvl="1" indent="-114300" algn="l" defTabSz="666750">
+          <a:pPr marL="114300" lvl="1" indent="-114300" algn="l" defTabSz="577850">
             <a:lnSpc>
               <a:spcPct val="90000"/>
             </a:lnSpc>
@@ -2052,13 +2126,13 @@
             <a:buChar char="••"/>
           </a:pPr>
           <a:r>
-            <a:rPr lang="en-US" sz="1500" kern="1200" dirty="0" smtClean="0"/>
+            <a:rPr lang="en-US" sz="1300" kern="1200" dirty="0" smtClean="0"/>
             <a:t>Persist R Objects to files for later loading</a:t>
           </a:r>
-          <a:endParaRPr lang="en-US" sz="1500" kern="1200" dirty="0"/>
+          <a:endParaRPr lang="en-US" sz="1300" kern="1200" dirty="0"/>
         </a:p>
         <a:p>
-          <a:pPr marL="114300" lvl="1" indent="-114300" algn="l" defTabSz="666750">
+          <a:pPr marL="114300" lvl="1" indent="-114300" algn="l" defTabSz="577850">
             <a:lnSpc>
               <a:spcPct val="90000"/>
             </a:lnSpc>
@@ -2071,13 +2145,13 @@
             <a:buChar char="••"/>
           </a:pPr>
           <a:r>
-            <a:rPr lang="en-US" sz="1500" kern="1200" dirty="0" smtClean="0"/>
+            <a:rPr lang="en-US" sz="1300" kern="1200" dirty="0" smtClean="0"/>
             <a:t>Persist business R Objects to database (optional)</a:t>
           </a:r>
-          <a:endParaRPr lang="en-US" sz="1500" kern="1200" dirty="0"/>
+          <a:endParaRPr lang="en-US" sz="1300" kern="1200" dirty="0"/>
         </a:p>
         <a:p>
-          <a:pPr marL="114300" lvl="1" indent="-114300" algn="l" defTabSz="666750">
+          <a:pPr marL="114300" lvl="1" indent="-114300" algn="l" defTabSz="577850">
             <a:lnSpc>
               <a:spcPct val="90000"/>
             </a:lnSpc>
@@ -2090,13 +2164,13 @@
             <a:buChar char="••"/>
           </a:pPr>
           <a:r>
-            <a:rPr lang="en-US" sz="1500" kern="1200" dirty="0" smtClean="0"/>
+            <a:rPr lang="en-US" sz="1300" kern="1200" dirty="0" smtClean="0"/>
             <a:t>Merging business and review for selected business and states</a:t>
           </a:r>
-          <a:endParaRPr lang="en-US" sz="1500" kern="1200" dirty="0"/>
+          <a:endParaRPr lang="en-US" sz="1300" kern="1200" dirty="0"/>
         </a:p>
         <a:p>
-          <a:pPr marL="114300" lvl="1" indent="-114300" algn="l" defTabSz="666750">
+          <a:pPr marL="114300" lvl="1" indent="-114300" algn="l" defTabSz="577850">
             <a:lnSpc>
               <a:spcPct val="90000"/>
             </a:lnSpc>
@@ -2109,15 +2183,15 @@
             <a:buChar char="••"/>
           </a:pPr>
           <a:r>
-            <a:rPr lang="en-US" sz="1500" kern="1200" dirty="0" smtClean="0"/>
+            <a:rPr lang="en-US" sz="1300" kern="1200" dirty="0" smtClean="0"/>
             <a:t>Persist the merged result to a table in an RDBMS for use and query later</a:t>
           </a:r>
-          <a:endParaRPr lang="en-US" sz="1500" kern="1200" dirty="0"/>
+          <a:endParaRPr lang="en-US" sz="1300" kern="1200" dirty="0"/>
         </a:p>
       </dsp:txBody>
       <dsp:txXfrm>
-        <a:off x="0" y="235961"/>
-        <a:ext cx="8128000" cy="1606500"/>
+        <a:off x="0" y="484069"/>
+        <a:ext cx="8128000" cy="1392300"/>
       </dsp:txXfrm>
     </dsp:sp>
     <dsp:sp modelId="{9D328815-686E-4587-8A37-16ECD0204B6B}">
@@ -2127,8 +2201,8 @@
       </dsp:nvSpPr>
       <dsp:spPr>
         <a:xfrm>
-          <a:off x="406400" y="14561"/>
-          <a:ext cx="5689600" cy="442800"/>
+          <a:off x="406400" y="292189"/>
+          <a:ext cx="5689600" cy="383760"/>
         </a:xfrm>
         <a:prstGeom prst="roundRect">
           <a:avLst/>
@@ -2178,7 +2252,7 @@
         </a:bodyPr>
         <a:lstStyle/>
         <a:p>
-          <a:pPr lvl="0" algn="l" defTabSz="666750">
+          <a:pPr lvl="0" algn="l" defTabSz="577850">
             <a:lnSpc>
               <a:spcPct val="90000"/>
             </a:lnSpc>
@@ -2190,15 +2264,15 @@
             </a:spcAft>
           </a:pPr>
           <a:r>
-            <a:rPr lang="en-US" sz="1500" kern="1200" dirty="0" smtClean="0"/>
+            <a:rPr lang="en-US" sz="1300" kern="1200" dirty="0" smtClean="0"/>
             <a:t>Getting, cleaning, and preparing data</a:t>
           </a:r>
-          <a:endParaRPr lang="en-US" sz="1500" kern="1200" dirty="0"/>
+          <a:endParaRPr lang="en-US" sz="1300" kern="1200" dirty="0"/>
         </a:p>
       </dsp:txBody>
       <dsp:txXfrm>
-        <a:off x="428016" y="36177"/>
-        <a:ext cx="5646368" cy="399568"/>
+        <a:off x="425134" y="310923"/>
+        <a:ext cx="5652132" cy="346292"/>
       </dsp:txXfrm>
     </dsp:sp>
     <dsp:sp modelId="{904B8CB1-8C8B-40AF-B953-D228748C4D2E}">
@@ -2208,8 +2282,8 @@
       </dsp:nvSpPr>
       <dsp:spPr>
         <a:xfrm>
-          <a:off x="0" y="2144861"/>
-          <a:ext cx="8128000" cy="1842750"/>
+          <a:off x="0" y="2138449"/>
+          <a:ext cx="8128000" cy="1392300"/>
         </a:xfrm>
         <a:prstGeom prst="rect">
           <a:avLst/>
@@ -2253,12 +2327,12 @@
         <a:fontRef idx="minor"/>
       </dsp:style>
       <dsp:txBody>
-        <a:bodyPr spcFirstLastPara="0" vert="horz" wrap="square" lIns="630823" tIns="312420" rIns="630823" bIns="106680" numCol="1" spcCol="1270" anchor="t" anchorCtr="0">
+        <a:bodyPr spcFirstLastPara="0" vert="horz" wrap="square" lIns="630823" tIns="270764" rIns="630823" bIns="92456" numCol="1" spcCol="1270" anchor="t" anchorCtr="0">
           <a:noAutofit/>
         </a:bodyPr>
         <a:lstStyle/>
         <a:p>
-          <a:pPr marL="114300" lvl="1" indent="-114300" algn="l" defTabSz="666750">
+          <a:pPr marL="114300" lvl="1" indent="-114300" algn="l" defTabSz="577850">
             <a:lnSpc>
               <a:spcPct val="90000"/>
             </a:lnSpc>
@@ -2271,13 +2345,13 @@
             <a:buChar char="••"/>
           </a:pPr>
           <a:r>
-            <a:rPr lang="en-US" sz="1500" kern="1200" dirty="0" smtClean="0"/>
+            <a:rPr lang="en-US" sz="1300" kern="1200" dirty="0" smtClean="0"/>
             <a:t>Query business and review text for only healthcare related business in Arizona state</a:t>
           </a:r>
-          <a:endParaRPr lang="en-US" sz="1500" kern="1200" dirty="0"/>
+          <a:endParaRPr lang="en-US" sz="1300" kern="1200" dirty="0"/>
         </a:p>
         <a:p>
-          <a:pPr marL="114300" lvl="1" indent="-114300" algn="l" defTabSz="666750">
+          <a:pPr marL="114300" lvl="1" indent="-114300" algn="l" defTabSz="577850">
             <a:lnSpc>
               <a:spcPct val="90000"/>
             </a:lnSpc>
@@ -2290,13 +2364,13 @@
             <a:buChar char="••"/>
           </a:pPr>
           <a:r>
-            <a:rPr lang="en-US" sz="1500" kern="1200" dirty="0" smtClean="0"/>
+            <a:rPr lang="en-US" sz="1300" kern="1200" dirty="0" smtClean="0"/>
             <a:t>Create corpus, remove punctuations, number, stop words</a:t>
           </a:r>
-          <a:endParaRPr lang="en-US" sz="1500" kern="1200" dirty="0"/>
+          <a:endParaRPr lang="en-US" sz="1300" kern="1200" dirty="0"/>
         </a:p>
         <a:p>
-          <a:pPr marL="114300" lvl="1" indent="-114300" algn="l" defTabSz="666750">
+          <a:pPr marL="114300" lvl="1" indent="-114300" algn="l" defTabSz="577850">
             <a:lnSpc>
               <a:spcPct val="90000"/>
             </a:lnSpc>
@@ -2309,13 +2383,13 @@
             <a:buChar char="••"/>
           </a:pPr>
           <a:r>
-            <a:rPr lang="en-US" sz="1500" kern="1200" dirty="0" smtClean="0"/>
+            <a:rPr lang="en-US" sz="1300" kern="1200" dirty="0" smtClean="0"/>
             <a:t>Stemming all documents</a:t>
           </a:r>
-          <a:endParaRPr lang="en-US" sz="1500" kern="1200" dirty="0"/>
+          <a:endParaRPr lang="en-US" sz="1300" kern="1200" dirty="0"/>
         </a:p>
         <a:p>
-          <a:pPr marL="114300" lvl="1" indent="-114300" algn="l" defTabSz="666750">
+          <a:pPr marL="114300" lvl="1" indent="-114300" algn="l" defTabSz="577850">
             <a:lnSpc>
               <a:spcPct val="90000"/>
             </a:lnSpc>
@@ -2328,13 +2402,13 @@
             <a:buChar char="••"/>
           </a:pPr>
           <a:r>
-            <a:rPr lang="en-US" sz="1500" kern="1200" dirty="0" smtClean="0"/>
+            <a:rPr lang="en-US" sz="1300" kern="1200" dirty="0" smtClean="0"/>
             <a:t>Using R tm package to create Document term matrix (DTM) and term document matrix (TDM) </a:t>
           </a:r>
-          <a:endParaRPr lang="en-US" sz="1500" kern="1200" dirty="0"/>
+          <a:endParaRPr lang="en-US" sz="1300" kern="1200" dirty="0"/>
         </a:p>
         <a:p>
-          <a:pPr marL="114300" lvl="1" indent="-114300" algn="l" defTabSz="666750">
+          <a:pPr marL="114300" lvl="1" indent="-114300" algn="l" defTabSz="577850">
             <a:lnSpc>
               <a:spcPct val="90000"/>
             </a:lnSpc>
@@ -2347,15 +2421,15 @@
             <a:buChar char="••"/>
           </a:pPr>
           <a:r>
-            <a:rPr lang="en-US" sz="1500" kern="1200" dirty="0" smtClean="0"/>
+            <a:rPr lang="en-US" sz="1300" kern="1200" dirty="0" smtClean="0"/>
             <a:t>Remove sparsity</a:t>
           </a:r>
-          <a:endParaRPr lang="en-US" sz="1500" kern="1200" dirty="0"/>
+          <a:endParaRPr lang="en-US" sz="1300" kern="1200" dirty="0"/>
         </a:p>
       </dsp:txBody>
       <dsp:txXfrm>
-        <a:off x="0" y="2144861"/>
-        <a:ext cx="8128000" cy="1842750"/>
+        <a:off x="0" y="2138449"/>
+        <a:ext cx="8128000" cy="1392300"/>
       </dsp:txXfrm>
     </dsp:sp>
     <dsp:sp modelId="{88425A1B-CE82-4A74-86D7-DFF3A0D39D54}">
@@ -2365,8 +2439,8 @@
       </dsp:nvSpPr>
       <dsp:spPr>
         <a:xfrm>
-          <a:off x="406400" y="1923461"/>
-          <a:ext cx="5689600" cy="442800"/>
+          <a:off x="406400" y="1946569"/>
+          <a:ext cx="5689600" cy="383760"/>
         </a:xfrm>
         <a:prstGeom prst="roundRect">
           <a:avLst/>
@@ -2416,7 +2490,7 @@
         </a:bodyPr>
         <a:lstStyle/>
         <a:p>
-          <a:pPr lvl="0" algn="l" defTabSz="666750">
+          <a:pPr lvl="0" algn="l" defTabSz="577850">
             <a:lnSpc>
               <a:spcPct val="90000"/>
             </a:lnSpc>
@@ -2428,15 +2502,15 @@
             </a:spcAft>
           </a:pPr>
           <a:r>
-            <a:rPr lang="en-US" sz="1500" kern="1200" dirty="0" smtClean="0"/>
+            <a:rPr lang="en-US" sz="1300" kern="1200" dirty="0" smtClean="0"/>
             <a:t>Text mining basics</a:t>
           </a:r>
-          <a:endParaRPr lang="en-US" sz="1500" kern="1200" dirty="0"/>
+          <a:endParaRPr lang="en-US" sz="1300" kern="1200" dirty="0"/>
         </a:p>
       </dsp:txBody>
       <dsp:txXfrm>
-        <a:off x="428016" y="1945077"/>
-        <a:ext cx="5646368" cy="399568"/>
+        <a:off x="425134" y="1965303"/>
+        <a:ext cx="5652132" cy="346292"/>
       </dsp:txXfrm>
     </dsp:sp>
     <dsp:sp modelId="{2D50D6F6-D45C-434F-B4FD-F7EEEBB3D0E6}">
@@ -2446,8 +2520,8 @@
       </dsp:nvSpPr>
       <dsp:spPr>
         <a:xfrm>
-          <a:off x="0" y="4290012"/>
-          <a:ext cx="8128000" cy="637875"/>
+          <a:off x="0" y="3792829"/>
+          <a:ext cx="8128000" cy="982800"/>
         </a:xfrm>
         <a:prstGeom prst="rect">
           <a:avLst/>
@@ -2491,12 +2565,12 @@
         <a:fontRef idx="minor"/>
       </dsp:style>
       <dsp:txBody>
-        <a:bodyPr spcFirstLastPara="0" vert="horz" wrap="square" lIns="630823" tIns="312420" rIns="630823" bIns="106680" numCol="1" spcCol="1270" anchor="t" anchorCtr="0">
+        <a:bodyPr spcFirstLastPara="0" vert="horz" wrap="square" lIns="630823" tIns="270764" rIns="630823" bIns="92456" numCol="1" spcCol="1270" anchor="t" anchorCtr="0">
           <a:noAutofit/>
         </a:bodyPr>
         <a:lstStyle/>
         <a:p>
-          <a:pPr marL="114300" lvl="1" indent="-114300" algn="l" defTabSz="666750">
+          <a:pPr marL="114300" lvl="1" indent="-114300" algn="l" defTabSz="577850">
             <a:lnSpc>
               <a:spcPct val="90000"/>
             </a:lnSpc>
@@ -2509,15 +2583,53 @@
             <a:buChar char="••"/>
           </a:pPr>
           <a:r>
-            <a:rPr lang="en-US" sz="1500" kern="1200" dirty="0" smtClean="0"/>
+            <a:rPr lang="en-US" sz="1300" kern="1200" dirty="0" smtClean="0"/>
             <a:t>Group and label the review text with a topic</a:t>
           </a:r>
-          <a:endParaRPr lang="en-US" sz="1500" kern="1200" dirty="0"/>
+          <a:endParaRPr lang="en-US" sz="1300" kern="1200" dirty="0"/>
+        </a:p>
+        <a:p>
+          <a:pPr marL="114300" lvl="1" indent="-114300" algn="l" defTabSz="577850">
+            <a:lnSpc>
+              <a:spcPct val="90000"/>
+            </a:lnSpc>
+            <a:spcBef>
+              <a:spcPct val="0"/>
+            </a:spcBef>
+            <a:spcAft>
+              <a:spcPct val="15000"/>
+            </a:spcAft>
+            <a:buChar char="••"/>
+          </a:pPr>
+          <a:r>
+            <a:rPr lang="en-US" sz="1300" kern="1200" dirty="0" smtClean="0"/>
+            <a:t>Cross reference the topic and review stars also topic, review star, and business star</a:t>
+          </a:r>
+          <a:endParaRPr lang="en-US" sz="1300" kern="1200" dirty="0"/>
+        </a:p>
+        <a:p>
+          <a:pPr marL="114300" lvl="1" indent="-114300" algn="l" defTabSz="577850">
+            <a:lnSpc>
+              <a:spcPct val="90000"/>
+            </a:lnSpc>
+            <a:spcBef>
+              <a:spcPct val="0"/>
+            </a:spcBef>
+            <a:spcAft>
+              <a:spcPct val="15000"/>
+            </a:spcAft>
+            <a:buChar char="••"/>
+          </a:pPr>
+          <a:r>
+            <a:rPr lang="en-US" sz="1300" kern="1200" dirty="0" smtClean="0"/>
+            <a:t>Uncover the terms that are indicative of positive, negative reviews</a:t>
+          </a:r>
+          <a:endParaRPr lang="en-US" sz="1300" kern="1200" dirty="0"/>
         </a:p>
       </dsp:txBody>
       <dsp:txXfrm>
-        <a:off x="0" y="4290012"/>
-        <a:ext cx="8128000" cy="637875"/>
+        <a:off x="0" y="3792829"/>
+        <a:ext cx="8128000" cy="982800"/>
       </dsp:txXfrm>
     </dsp:sp>
     <dsp:sp modelId="{A414A348-CDA7-41FF-A3DC-FDE2157D9BCB}">
@@ -2527,8 +2639,8 @@
       </dsp:nvSpPr>
       <dsp:spPr>
         <a:xfrm>
-          <a:off x="406400" y="4068612"/>
-          <a:ext cx="5689600" cy="442800"/>
+          <a:off x="406400" y="3600949"/>
+          <a:ext cx="5689600" cy="383760"/>
         </a:xfrm>
         <a:prstGeom prst="roundRect">
           <a:avLst/>
@@ -2578,7 +2690,7 @@
         </a:bodyPr>
         <a:lstStyle/>
         <a:p>
-          <a:pPr lvl="0" algn="l" defTabSz="666750">
+          <a:pPr lvl="0" algn="l" defTabSz="577850">
             <a:lnSpc>
               <a:spcPct val="90000"/>
             </a:lnSpc>
@@ -2590,27 +2702,23 @@
             </a:spcAft>
           </a:pPr>
           <a:r>
-            <a:rPr lang="en-US" sz="1500" kern="1200" dirty="0" smtClean="0"/>
-            <a:t>Topic Modeling </a:t>
+            <a:rPr lang="en-US" sz="1300" kern="1200" dirty="0" smtClean="0"/>
+            <a:t>Topic Modeling  using Latent </a:t>
           </a:r>
           <a:r>
-            <a:rPr lang="en-US" sz="1500" kern="1200" dirty="0" smtClean="0"/>
-            <a:t> using Latent </a:t>
-          </a:r>
-          <a:r>
-            <a:rPr lang="en-US" sz="1500" kern="1200" dirty="0" err="1" smtClean="0"/>
+            <a:rPr lang="en-US" sz="1300" kern="1200" dirty="0" err="1" smtClean="0"/>
             <a:t>Dirichlet</a:t>
           </a:r>
           <a:r>
-            <a:rPr lang="en-US" sz="1500" kern="1200" dirty="0" smtClean="0"/>
+            <a:rPr lang="en-US" sz="1300" kern="1200" dirty="0" smtClean="0"/>
             <a:t> Allocation (LDA)</a:t>
           </a:r>
-          <a:endParaRPr lang="en-US" sz="1500" kern="1200" dirty="0"/>
+          <a:endParaRPr lang="en-US" sz="1300" kern="1200" dirty="0"/>
         </a:p>
       </dsp:txBody>
       <dsp:txXfrm>
-        <a:off x="428016" y="4090228"/>
-        <a:ext cx="5646368" cy="399568"/>
+        <a:off x="425134" y="3619683"/>
+        <a:ext cx="5652132" cy="346292"/>
       </dsp:txXfrm>
     </dsp:sp>
     <dsp:sp modelId="{F0AF03FD-7C24-4393-9342-DAE729543B66}">
@@ -2620,8 +2728,8 @@
       </dsp:nvSpPr>
       <dsp:spPr>
         <a:xfrm>
-          <a:off x="0" y="5230287"/>
-          <a:ext cx="8128000" cy="637875"/>
+          <a:off x="0" y="5037709"/>
+          <a:ext cx="8128000" cy="552825"/>
         </a:xfrm>
         <a:prstGeom prst="rect">
           <a:avLst/>
@@ -2665,12 +2773,12 @@
         <a:fontRef idx="minor"/>
       </dsp:style>
       <dsp:txBody>
-        <a:bodyPr spcFirstLastPara="0" vert="horz" wrap="square" lIns="630823" tIns="312420" rIns="630823" bIns="106680" numCol="1" spcCol="1270" anchor="t" anchorCtr="0">
+        <a:bodyPr spcFirstLastPara="0" vert="horz" wrap="square" lIns="630823" tIns="270764" rIns="630823" bIns="92456" numCol="1" spcCol="1270" anchor="t" anchorCtr="0">
           <a:noAutofit/>
         </a:bodyPr>
         <a:lstStyle/>
         <a:p>
-          <a:pPr marL="114300" lvl="1" indent="-114300" algn="l" defTabSz="666750">
+          <a:pPr marL="114300" lvl="1" indent="-114300" algn="l" defTabSz="577850">
             <a:lnSpc>
               <a:spcPct val="90000"/>
             </a:lnSpc>
@@ -2683,15 +2791,15 @@
             <a:buChar char="••"/>
           </a:pPr>
           <a:r>
-            <a:rPr lang="en-US" sz="1500" kern="1200" dirty="0" smtClean="0"/>
+            <a:rPr lang="en-US" sz="1300" kern="1200" dirty="0" smtClean="0"/>
             <a:t>Finding similarities among the review documents</a:t>
           </a:r>
-          <a:endParaRPr lang="en-US" sz="1500" kern="1200" dirty="0"/>
+          <a:endParaRPr lang="en-US" sz="1300" kern="1200" dirty="0"/>
         </a:p>
       </dsp:txBody>
       <dsp:txXfrm>
-        <a:off x="0" y="5230287"/>
-        <a:ext cx="8128000" cy="637875"/>
+        <a:off x="0" y="5037709"/>
+        <a:ext cx="8128000" cy="552825"/>
       </dsp:txXfrm>
     </dsp:sp>
     <dsp:sp modelId="{FE0A26DD-C5A2-43C1-9715-13BAD5CF0CBE}">
@@ -2701,8 +2809,8 @@
       </dsp:nvSpPr>
       <dsp:spPr>
         <a:xfrm>
-          <a:off x="406400" y="5008887"/>
-          <a:ext cx="5689600" cy="442800"/>
+          <a:off x="406400" y="4845829"/>
+          <a:ext cx="5689600" cy="383760"/>
         </a:xfrm>
         <a:prstGeom prst="roundRect">
           <a:avLst/>
@@ -2752,7 +2860,7 @@
         </a:bodyPr>
         <a:lstStyle/>
         <a:p>
-          <a:pPr lvl="0" algn="l" defTabSz="666750">
+          <a:pPr lvl="0" algn="l" defTabSz="577850">
             <a:lnSpc>
               <a:spcPct val="90000"/>
             </a:lnSpc>
@@ -2764,15 +2872,15 @@
             </a:spcAft>
           </a:pPr>
           <a:r>
-            <a:rPr lang="en-US" sz="1500" kern="1200" dirty="0" smtClean="0"/>
+            <a:rPr lang="en-US" sz="1300" kern="1200" dirty="0" smtClean="0"/>
             <a:t>Latent Semantic Analysis (LSA)</a:t>
           </a:r>
-          <a:endParaRPr lang="en-US" sz="1500" kern="1200" dirty="0"/>
+          <a:endParaRPr lang="en-US" sz="1300" kern="1200" dirty="0"/>
         </a:p>
       </dsp:txBody>
       <dsp:txXfrm>
-        <a:off x="428016" y="5030503"/>
-        <a:ext cx="5646368" cy="399568"/>
+        <a:off x="425134" y="4864563"/>
+        <a:ext cx="5652132" cy="346292"/>
       </dsp:txXfrm>
     </dsp:sp>
   </dsp:spTree>
@@ -4465,7 +4573,7 @@
           <a:p>
             <a:fld id="{9C0B4EDF-910D-4BD1-B251-EEA832C828E4}" type="datetimeFigureOut">
               <a:rPr lang="en-US" smtClean="0"/>
-              <a:t>11/20/2015</a:t>
+              <a:t>11/21/2015</a:t>
             </a:fld>
             <a:endParaRPr lang="en-US"/>
           </a:p>
@@ -4635,7 +4743,7 @@
           <a:p>
             <a:fld id="{9C0B4EDF-910D-4BD1-B251-EEA832C828E4}" type="datetimeFigureOut">
               <a:rPr lang="en-US" smtClean="0"/>
-              <a:t>11/20/2015</a:t>
+              <a:t>11/21/2015</a:t>
             </a:fld>
             <a:endParaRPr lang="en-US"/>
           </a:p>
@@ -4815,7 +4923,7 @@
           <a:p>
             <a:fld id="{9C0B4EDF-910D-4BD1-B251-EEA832C828E4}" type="datetimeFigureOut">
               <a:rPr lang="en-US" smtClean="0"/>
-              <a:t>11/20/2015</a:t>
+              <a:t>11/21/2015</a:t>
             </a:fld>
             <a:endParaRPr lang="en-US"/>
           </a:p>
@@ -4985,7 +5093,7 @@
           <a:p>
             <a:fld id="{9C0B4EDF-910D-4BD1-B251-EEA832C828E4}" type="datetimeFigureOut">
               <a:rPr lang="en-US" smtClean="0"/>
-              <a:t>11/20/2015</a:t>
+              <a:t>11/21/2015</a:t>
             </a:fld>
             <a:endParaRPr lang="en-US"/>
           </a:p>
@@ -5231,7 +5339,7 @@
           <a:p>
             <a:fld id="{9C0B4EDF-910D-4BD1-B251-EEA832C828E4}" type="datetimeFigureOut">
               <a:rPr lang="en-US" smtClean="0"/>
-              <a:t>11/20/2015</a:t>
+              <a:t>11/21/2015</a:t>
             </a:fld>
             <a:endParaRPr lang="en-US"/>
           </a:p>
@@ -5463,7 +5571,7 @@
           <a:p>
             <a:fld id="{9C0B4EDF-910D-4BD1-B251-EEA832C828E4}" type="datetimeFigureOut">
               <a:rPr lang="en-US" smtClean="0"/>
-              <a:t>11/20/2015</a:t>
+              <a:t>11/21/2015</a:t>
             </a:fld>
             <a:endParaRPr lang="en-US"/>
           </a:p>
@@ -5830,7 +5938,7 @@
           <a:p>
             <a:fld id="{9C0B4EDF-910D-4BD1-B251-EEA832C828E4}" type="datetimeFigureOut">
               <a:rPr lang="en-US" smtClean="0"/>
-              <a:t>11/20/2015</a:t>
+              <a:t>11/21/2015</a:t>
             </a:fld>
             <a:endParaRPr lang="en-US"/>
           </a:p>
@@ -5948,7 +6056,7 @@
           <a:p>
             <a:fld id="{9C0B4EDF-910D-4BD1-B251-EEA832C828E4}" type="datetimeFigureOut">
               <a:rPr lang="en-US" smtClean="0"/>
-              <a:t>11/20/2015</a:t>
+              <a:t>11/21/2015</a:t>
             </a:fld>
             <a:endParaRPr lang="en-US"/>
           </a:p>
@@ -6043,7 +6151,7 @@
           <a:p>
             <a:fld id="{9C0B4EDF-910D-4BD1-B251-EEA832C828E4}" type="datetimeFigureOut">
               <a:rPr lang="en-US" smtClean="0"/>
-              <a:t>11/20/2015</a:t>
+              <a:t>11/21/2015</a:t>
             </a:fld>
             <a:endParaRPr lang="en-US"/>
           </a:p>
@@ -6320,7 +6428,7 @@
           <a:p>
             <a:fld id="{9C0B4EDF-910D-4BD1-B251-EEA832C828E4}" type="datetimeFigureOut">
               <a:rPr lang="en-US" smtClean="0"/>
-              <a:t>11/20/2015</a:t>
+              <a:t>11/21/2015</a:t>
             </a:fld>
             <a:endParaRPr lang="en-US"/>
           </a:p>
@@ -6573,7 +6681,7 @@
           <a:p>
             <a:fld id="{9C0B4EDF-910D-4BD1-B251-EEA832C828E4}" type="datetimeFigureOut">
               <a:rPr lang="en-US" smtClean="0"/>
-              <a:t>11/20/2015</a:t>
+              <a:t>11/21/2015</a:t>
             </a:fld>
             <a:endParaRPr lang="en-US"/>
           </a:p>
@@ -6786,7 +6894,7 @@
           <a:p>
             <a:fld id="{9C0B4EDF-910D-4BD1-B251-EEA832C828E4}" type="datetimeFigureOut">
               <a:rPr lang="en-US" smtClean="0"/>
-              <a:t>11/20/2015</a:t>
+              <a:t>11/21/2015</a:t>
             </a:fld>
             <a:endParaRPr lang="en-US"/>
           </a:p>
@@ -7445,7 +7553,7 @@
           <p:nvPr>
             <p:extLst>
               <p:ext uri="{D42A27DB-BD31-4B8C-83A1-F6EECF244321}">
-                <p14:modId xmlns:p14="http://schemas.microsoft.com/office/powerpoint/2010/main" val="3599853199"/>
+                <p14:modId xmlns:p14="http://schemas.microsoft.com/office/powerpoint/2010/main" val="2880115366"/>
               </p:ext>
             </p:extLst>
           </p:nvPr>
@@ -7578,15 +7686,7 @@
           <a:p>
             <a:r>
               <a:rPr lang="en-US" sz="2800" b="1" dirty="0" smtClean="0"/>
-              <a:t>Word cloud is an effective tool to get a quick and informative view of the data.   </a:t>
-            </a:r>
-            <a:r>
-              <a:rPr lang="en-US" sz="2800" b="1" dirty="0" smtClean="0"/>
-              <a:t>Data on the left cloud </a:t>
-            </a:r>
-            <a:r>
-              <a:rPr lang="en-US" sz="2800" b="1" dirty="0" smtClean="0"/>
-              <a:t>is 100% sparse, and  78% sparse on the right.  Both clouds immediate ‘tells’ the dataset is about ‘doctor’, ‘office’, and </a:t>
+              <a:t>Word cloud is an effective tool to get a quick and informative view of the data.   Data on the left cloud is 100% sparse, and  78% sparse on the right.  Both clouds immediate ‘tells’ the dataset is about ‘doctor’, ‘office’, and </a:t>
             </a:r>
             <a:r>
               <a:rPr lang="en-US" sz="3200" b="1" dirty="0" smtClean="0"/>
@@ -7777,20 +7877,7 @@
                 <a:effectLst/>
                 <a:latin typeface="Lucida Console" panose="020B0609040504020204" pitchFamily="49" charset="0"/>
               </a:rPr>
-              <a:t>&gt;&gt; </a:t>
-            </a:r>
-            <a:r>
-              <a:rPr kumimoji="0" lang="en-US" altLang="en-US" sz="1000" b="0" i="0" u="none" strike="noStrike" cap="none" normalizeH="0" baseline="0" dirty="0" smtClean="0">
-                <a:ln>
-                  <a:noFill/>
-                </a:ln>
-                <a:solidFill>
-                  <a:srgbClr val="000000"/>
-                </a:solidFill>
-                <a:effectLst/>
-                <a:latin typeface="Lucida Console" panose="020B0609040504020204" pitchFamily="49" charset="0"/>
-              </a:rPr>
-              <a:t>Non-/sparse entries: 533952/209531502 </a:t>
+              <a:t>&gt;&gt; Non-/sparse entries: 533952/209531502 </a:t>
             </a:r>
           </a:p>
           <a:p>
@@ -7963,16 +8050,6 @@
               </a:rPr>
               <a:t> (documents: 10827, terms: 19402)</a:t>
             </a:r>
-            <a:endParaRPr kumimoji="0" lang="en-US" altLang="en-US" sz="1000" b="0" i="0" u="none" strike="noStrike" cap="none" normalizeH="0" baseline="0" dirty="0" smtClean="0">
-              <a:ln>
-                <a:noFill/>
-              </a:ln>
-              <a:solidFill>
-                <a:srgbClr val="000000"/>
-              </a:solidFill>
-              <a:effectLst/>
-              <a:latin typeface="Lucida Console" panose="020B0609040504020204" pitchFamily="49" charset="0"/>
-            </a:endParaRPr>
           </a:p>
         </p:txBody>
       </p:sp>
@@ -8354,7 +8431,7 @@
         </p:spPr>
         <p:txBody>
           <a:bodyPr>
-            <a:normAutofit lnSpcReduction="10000"/>
+            <a:normAutofit fontScale="85000" lnSpcReduction="20000"/>
           </a:bodyPr>
           <a:lstStyle/>
           <a:p>
@@ -8367,14 +8444,26 @@
               <a:t>good reviews: </a:t>
             </a:r>
             <a:r>
-              <a:rPr lang="en-US" dirty="0" err="1" smtClean="0"/>
+              <a:rPr lang="en-US" dirty="0" err="1" smtClean="0">
+                <a:solidFill>
+                  <a:srgbClr val="FF0000"/>
+                </a:solidFill>
+              </a:rPr>
               <a:t>best,friend</a:t>
             </a:r>
             <a:r>
-              <a:rPr lang="en-US" dirty="0"/>
+              <a:rPr lang="en-US" dirty="0">
+                <a:solidFill>
+                  <a:srgbClr val="FF0000"/>
+                </a:solidFill>
+              </a:rPr>
               <a:t>, recommend, good, great, help </a:t>
             </a:r>
-            <a:endParaRPr lang="en-US" dirty="0" smtClean="0"/>
+            <a:endParaRPr lang="en-US" dirty="0" smtClean="0">
+              <a:solidFill>
+                <a:srgbClr val="FF0000"/>
+              </a:solidFill>
+            </a:endParaRPr>
           </a:p>
           <a:p>
             <a:r>
@@ -8396,12 +8485,12 @@
               <a:t>The </a:t>
             </a:r>
             <a:r>
-              <a:rPr lang="en-US" dirty="0" err="1" smtClean="0"/>
-              <a:t>textes</a:t>
-            </a:r>
-            <a:r>
               <a:rPr lang="en-US" dirty="0" smtClean="0"/>
-              <a:t> that contains these phrases are labelled under the same topic</a:t>
+              <a:t>text </a:t>
+            </a:r>
+            <a:r>
+              <a:rPr lang="en-US" dirty="0" smtClean="0"/>
+              <a:t>that contains these phrases are labelled under the same topic</a:t>
             </a:r>
           </a:p>
           <a:p>
@@ -8414,13 +8503,36 @@
             <a:pPr lvl="1"/>
             <a:r>
               <a:rPr lang="en-US" dirty="0" smtClean="0"/>
-              <a:t>LSA finds that the two review text in the example above are quite ‘far’ apart.</a:t>
-            </a:r>
-          </a:p>
-          <a:p>
+              <a:t>LSA finds that the two review text in the example above are quite ‘far’ apart</a:t>
+            </a:r>
             <a:r>
               <a:rPr lang="en-US" dirty="0" smtClean="0"/>
-              <a:t>Next step:</a:t>
+              <a:t>.</a:t>
+            </a:r>
+          </a:p>
+          <a:p>
+            <a:pPr lvl="1"/>
+            <a:r>
+              <a:rPr lang="en-US" dirty="0" smtClean="0"/>
+              <a:t>LDA and LSA can be used in complement each other for different tasks-topic modeling and clustering documents and/or queries</a:t>
+            </a:r>
+            <a:endParaRPr lang="en-US" dirty="0" smtClean="0"/>
+          </a:p>
+          <a:p>
+            <a:r>
+              <a:rPr lang="en-US" dirty="0" smtClean="0"/>
+              <a:t>The number of reviews for poor ranking businesses are much lower than good business.  It seems that when service is poor, users may not bother spending time to write reviews.  </a:t>
+            </a:r>
+            <a:endParaRPr lang="en-US" dirty="0"/>
+          </a:p>
+          <a:p>
+            <a:r>
+              <a:rPr lang="en-US" dirty="0" smtClean="0"/>
+              <a:t>Next </a:t>
+            </a:r>
+            <a:r>
+              <a:rPr lang="en-US" dirty="0" smtClean="0"/>
+              <a:t>step:</a:t>
             </a:r>
           </a:p>
           <a:p>

</xml_diff>